<commit_message>
updated slides and added some files to projects
</commit_message>
<xml_diff>
--- a/ClassMaterials/JavaIntro/Slides/JavaIntro.pptx
+++ b/ClassMaterials/JavaIntro/Slides/JavaIntro.pptx
@@ -6,7 +6,7 @@
     <p:sldMasterId id="2147483660" r:id="rId2"/>
   </p:sldMasterIdLst>
   <p:notesMasterIdLst>
-    <p:notesMasterId r:id="rId40"/>
+    <p:notesMasterId r:id="rId41"/>
   </p:notesMasterIdLst>
   <p:sldIdLst>
     <p:sldId id="256" r:id="rId3"/>
@@ -40,12 +40,13 @@
     <p:sldId id="319" r:id="rId31"/>
     <p:sldId id="288" r:id="rId32"/>
     <p:sldId id="289" r:id="rId33"/>
-    <p:sldId id="290" r:id="rId34"/>
-    <p:sldId id="291" r:id="rId35"/>
-    <p:sldId id="320" r:id="rId36"/>
-    <p:sldId id="325" r:id="rId37"/>
-    <p:sldId id="331" r:id="rId38"/>
-    <p:sldId id="274" r:id="rId39"/>
+    <p:sldId id="332" r:id="rId34"/>
+    <p:sldId id="290" r:id="rId35"/>
+    <p:sldId id="291" r:id="rId36"/>
+    <p:sldId id="320" r:id="rId37"/>
+    <p:sldId id="325" r:id="rId38"/>
+    <p:sldId id="331" r:id="rId39"/>
+    <p:sldId id="274" r:id="rId40"/>
   </p:sldIdLst>
   <p:sldSz cx="9144000" cy="6858000" type="screen4x3"/>
   <p:notesSz cx="6858000" cy="9144000"/>
@@ -884,7 +885,7 @@
       </p:grpSpPr>
       <p:sp>
         <p:nvSpPr>
-          <p:cNvPr id="77" name="Shape 77"/>
+          <p:cNvPr id="2" name="Slide Image Placeholder 1"/>
           <p:cNvSpPr>
             <a:spLocks noGrp="1" noRot="1" noChangeAspect="1"/>
           </p:cNvSpPr>
@@ -892,285 +893,39 @@
             <p:ph type="sldImg"/>
           </p:nvPr>
         </p:nvSpPr>
-        <p:spPr>
-          <a:prstGeom prst="rect">
-            <a:avLst/>
-          </a:prstGeom>
-        </p:spPr>
+        <p:spPr/>
+      </p:sp>
+      <p:sp>
+        <p:nvSpPr>
+          <p:cNvPr id="3" name="Notes Placeholder 2"/>
+          <p:cNvSpPr>
+            <a:spLocks noGrp="1"/>
+          </p:cNvSpPr>
+          <p:nvPr>
+            <p:ph type="body" idx="1"/>
+          </p:nvPr>
+        </p:nvSpPr>
+        <p:spPr/>
         <p:txBody>
           <a:bodyPr/>
           <a:lstStyle/>
           <a:p>
-            <a:pPr lvl="0"/>
-            <a:endParaRPr/>
-          </a:p>
-        </p:txBody>
-      </p:sp>
-      <p:sp>
-        <p:nvSpPr>
-          <p:cNvPr id="78" name="Shape 78"/>
-          <p:cNvSpPr>
-            <a:spLocks noGrp="1"/>
-          </p:cNvSpPr>
-          <p:nvPr>
-            <p:ph type="body" sz="quarter" idx="1"/>
-          </p:nvPr>
-        </p:nvSpPr>
-        <p:spPr>
-          <a:prstGeom prst="rect">
-            <a:avLst/>
-          </a:prstGeom>
-        </p:spPr>
-        <p:txBody>
-          <a:bodyPr/>
-          <a:lstStyle/>
-          <a:p>
-            <a:pPr lvl="0" defTabSz="914400">
-              <a:lnSpc>
-                <a:spcPct val="100000"/>
-              </a:lnSpc>
-              <a:spcBef>
-                <a:spcPts val="800"/>
-              </a:spcBef>
-              <a:defRPr sz="1800"/>
-            </a:pPr>
-            <a:r>
-              <a:rPr sz="2300">
-                <a:latin typeface="Calibri"/>
-                <a:ea typeface="Calibri"/>
-                <a:cs typeface="Calibri"/>
-                <a:sym typeface="Calibri"/>
-              </a:rPr>
-              <a:t>Find the documentation for the </a:t>
-            </a:r>
-            <a:r>
-              <a:rPr sz="2300" b="1">
-                <a:latin typeface="Calibri"/>
-                <a:ea typeface="Calibri"/>
-                <a:cs typeface="Calibri"/>
-                <a:sym typeface="Calibri"/>
-              </a:rPr>
-              <a:t>String</a:t>
-            </a:r>
-            <a:r>
-              <a:rPr sz="2300">
-                <a:latin typeface="Calibri"/>
-                <a:ea typeface="Calibri"/>
-                <a:cs typeface="Calibri"/>
-                <a:sym typeface="Calibri"/>
-              </a:rPr>
-              <a:t> class from one of the above links, as follows:</a:t>
-            </a:r>
-            <a:endParaRPr sz="1200">
-              <a:latin typeface="Calibri"/>
-              <a:ea typeface="Calibri"/>
-              <a:cs typeface="Calibri"/>
-              <a:sym typeface="Calibri"/>
-            </a:endParaRPr>
-          </a:p>
-          <a:p>
-            <a:pPr lvl="0" defTabSz="914400">
-              <a:lnSpc>
-                <a:spcPct val="100000"/>
-              </a:lnSpc>
-              <a:spcBef>
-                <a:spcPts val="600"/>
-              </a:spcBef>
-              <a:buSzPct val="100000"/>
-              <a:buChar char="-"/>
-              <a:defRPr sz="1800"/>
-            </a:pPr>
-            <a:r>
-              <a:rPr sz="1900">
-                <a:latin typeface="Calibri"/>
-                <a:ea typeface="Calibri"/>
-                <a:cs typeface="Calibri"/>
-                <a:sym typeface="Calibri"/>
-              </a:rPr>
-              <a:t> Click </a:t>
-            </a:r>
-            <a:r>
-              <a:rPr sz="1900">
-                <a:solidFill>
-                  <a:srgbClr val="9BBB59"/>
-                </a:solidFill>
-                <a:latin typeface="Calibri"/>
-                <a:ea typeface="Calibri"/>
-                <a:cs typeface="Calibri"/>
-                <a:sym typeface="Calibri"/>
-              </a:rPr>
-              <a:t>java.lang</a:t>
-            </a:r>
-            <a:r>
-              <a:rPr sz="1900">
-                <a:latin typeface="Calibri"/>
-                <a:ea typeface="Calibri"/>
-                <a:cs typeface="Calibri"/>
-                <a:sym typeface="Calibri"/>
-              </a:rPr>
-              <a:t> in the top-left pane</a:t>
-            </a:r>
-            <a:endParaRPr sz="1200">
-              <a:latin typeface="Calibri"/>
-              <a:ea typeface="Calibri"/>
-              <a:cs typeface="Calibri"/>
-              <a:sym typeface="Calibri"/>
-            </a:endParaRPr>
-          </a:p>
-          <a:p>
-            <a:pPr lvl="0" defTabSz="914400">
-              <a:lnSpc>
-                <a:spcPct val="100000"/>
-              </a:lnSpc>
-              <a:spcBef>
-                <a:spcPts val="600"/>
-              </a:spcBef>
-              <a:buSzPct val="100000"/>
-              <a:buChar char="-"/>
-              <a:defRPr sz="1800"/>
-            </a:pPr>
-            <a:r>
-              <a:rPr sz="1900">
-                <a:latin typeface="Calibri"/>
-                <a:ea typeface="Calibri"/>
-                <a:cs typeface="Calibri"/>
-                <a:sym typeface="Calibri"/>
-              </a:rPr>
-              <a:t> Then click </a:t>
-            </a:r>
-            <a:r>
-              <a:rPr sz="1900">
-                <a:solidFill>
-                  <a:srgbClr val="9BBB59"/>
-                </a:solidFill>
-                <a:latin typeface="Calibri"/>
-                <a:ea typeface="Calibri"/>
-                <a:cs typeface="Calibri"/>
-                <a:sym typeface="Calibri"/>
-              </a:rPr>
-              <a:t>String</a:t>
-            </a:r>
-            <a:r>
-              <a:rPr sz="1900">
-                <a:latin typeface="Calibri"/>
-                <a:ea typeface="Calibri"/>
-                <a:cs typeface="Calibri"/>
-                <a:sym typeface="Calibri"/>
-              </a:rPr>
-              <a:t> in the bottom-left pane</a:t>
-            </a:r>
-            <a:endParaRPr sz="1200">
-              <a:latin typeface="Calibri"/>
-              <a:ea typeface="Calibri"/>
-              <a:cs typeface="Calibri"/>
-              <a:sym typeface="Calibri"/>
-            </a:endParaRPr>
-          </a:p>
-          <a:p>
-            <a:pPr lvl="0" defTabSz="914400">
-              <a:lnSpc>
-                <a:spcPct val="100000"/>
-              </a:lnSpc>
-              <a:spcBef>
-                <a:spcPts val="400"/>
-              </a:spcBef>
-              <a:defRPr sz="1800"/>
-            </a:pPr>
-            <a:endParaRPr sz="1200">
-              <a:latin typeface="Calibri"/>
-              <a:ea typeface="Calibri"/>
-              <a:cs typeface="Calibri"/>
-              <a:sym typeface="Calibri"/>
-            </a:endParaRPr>
-          </a:p>
-          <a:p>
-            <a:pPr lvl="0" defTabSz="914400">
-              <a:lnSpc>
-                <a:spcPct val="100000"/>
-              </a:lnSpc>
-              <a:spcBef>
-                <a:spcPts val="400"/>
-              </a:spcBef>
-              <a:defRPr sz="1800"/>
-            </a:pPr>
-            <a:r>
-              <a:rPr sz="1200">
-                <a:latin typeface="Calibri"/>
-                <a:ea typeface="Calibri"/>
-                <a:cs typeface="Calibri"/>
-                <a:sym typeface="Calibri"/>
-              </a:rPr>
-              <a:t>Describe the parts of the String API documentation:</a:t>
-            </a:r>
-          </a:p>
-          <a:p>
-            <a:pPr lvl="0" defTabSz="914400">
-              <a:lnSpc>
-                <a:spcPct val="100000"/>
-              </a:lnSpc>
-              <a:spcBef>
-                <a:spcPts val="400"/>
-              </a:spcBef>
-              <a:defRPr sz="1800"/>
-            </a:pPr>
-            <a:r>
-              <a:rPr sz="1200">
-                <a:latin typeface="Calibri"/>
-                <a:ea typeface="Calibri"/>
-                <a:cs typeface="Calibri"/>
-                <a:sym typeface="Calibri"/>
-              </a:rPr>
-              <a:t>- description of the class</a:t>
-            </a:r>
-          </a:p>
-          <a:p>
-            <a:pPr lvl="0" defTabSz="914400">
-              <a:lnSpc>
-                <a:spcPct val="100000"/>
-              </a:lnSpc>
-              <a:spcBef>
-                <a:spcPts val="400"/>
-              </a:spcBef>
-              <a:defRPr sz="1800"/>
-            </a:pPr>
-            <a:r>
-              <a:rPr sz="1200">
-                <a:latin typeface="Calibri"/>
-                <a:ea typeface="Calibri"/>
-                <a:cs typeface="Calibri"/>
-                <a:sym typeface="Calibri"/>
-              </a:rPr>
-              <a:t>- summaries of all the fields, constructors, and method</a:t>
-            </a:r>
-          </a:p>
-          <a:p>
-            <a:pPr marL="162130" lvl="0" indent="-162130" defTabSz="914400">
-              <a:lnSpc>
-                <a:spcPct val="100000"/>
-              </a:lnSpc>
-              <a:spcBef>
-                <a:spcPts val="400"/>
-              </a:spcBef>
-              <a:buSzPct val="100000"/>
-              <a:buChar char="-"/>
-              <a:defRPr sz="1800"/>
-            </a:pPr>
-            <a:r>
-              <a:rPr sz="1200">
-                <a:latin typeface="Calibri"/>
-                <a:ea typeface="Calibri"/>
-                <a:cs typeface="Calibri"/>
-                <a:sym typeface="Calibri"/>
-              </a:rPr>
-              <a:t>detailed descriptions of everything</a:t>
-            </a:r>
+            <a:r>
+              <a:rPr lang="en-US" dirty="0" smtClean="0"/>
+              <a:t>Can decide to say this for next class</a:t>
+            </a:r>
+            <a:r>
+              <a:rPr lang="en-US" baseline="0" dirty="0" smtClean="0"/>
+              <a:t> or mention it now at least…</a:t>
+            </a:r>
+            <a:endParaRPr lang="en-US" dirty="0"/>
           </a:p>
         </p:txBody>
       </p:sp>
     </p:spTree>
     <p:extLst>
       <p:ext uri="{BB962C8B-B14F-4D97-AF65-F5344CB8AC3E}">
-        <p14:creationId xmlns:p14="http://schemas.microsoft.com/office/powerpoint/2010/main" val="1218477835"/>
+        <p14:creationId xmlns:p14="http://schemas.microsoft.com/office/powerpoint/2010/main" val="1609906805"/>
       </p:ext>
     </p:extLst>
   </p:cSld>
@@ -1199,6 +954,321 @@
       </p:grpSpPr>
       <p:sp>
         <p:nvSpPr>
+          <p:cNvPr id="77" name="Shape 77"/>
+          <p:cNvSpPr>
+            <a:spLocks noGrp="1" noRot="1" noChangeAspect="1"/>
+          </p:cNvSpPr>
+          <p:nvPr>
+            <p:ph type="sldImg"/>
+          </p:nvPr>
+        </p:nvSpPr>
+        <p:spPr>
+          <a:prstGeom prst="rect">
+            <a:avLst/>
+          </a:prstGeom>
+        </p:spPr>
+        <p:txBody>
+          <a:bodyPr/>
+          <a:lstStyle/>
+          <a:p>
+            <a:pPr lvl="0"/>
+            <a:endParaRPr/>
+          </a:p>
+        </p:txBody>
+      </p:sp>
+      <p:sp>
+        <p:nvSpPr>
+          <p:cNvPr id="78" name="Shape 78"/>
+          <p:cNvSpPr>
+            <a:spLocks noGrp="1"/>
+          </p:cNvSpPr>
+          <p:nvPr>
+            <p:ph type="body" sz="quarter" idx="1"/>
+          </p:nvPr>
+        </p:nvSpPr>
+        <p:spPr>
+          <a:prstGeom prst="rect">
+            <a:avLst/>
+          </a:prstGeom>
+        </p:spPr>
+        <p:txBody>
+          <a:bodyPr/>
+          <a:lstStyle/>
+          <a:p>
+            <a:pPr lvl="0" defTabSz="914400">
+              <a:lnSpc>
+                <a:spcPct val="100000"/>
+              </a:lnSpc>
+              <a:spcBef>
+                <a:spcPts val="800"/>
+              </a:spcBef>
+              <a:defRPr sz="1800"/>
+            </a:pPr>
+            <a:r>
+              <a:rPr sz="2300">
+                <a:latin typeface="Calibri"/>
+                <a:ea typeface="Calibri"/>
+                <a:cs typeface="Calibri"/>
+                <a:sym typeface="Calibri"/>
+              </a:rPr>
+              <a:t>Find the documentation for the </a:t>
+            </a:r>
+            <a:r>
+              <a:rPr sz="2300" b="1">
+                <a:latin typeface="Calibri"/>
+                <a:ea typeface="Calibri"/>
+                <a:cs typeface="Calibri"/>
+                <a:sym typeface="Calibri"/>
+              </a:rPr>
+              <a:t>String</a:t>
+            </a:r>
+            <a:r>
+              <a:rPr sz="2300">
+                <a:latin typeface="Calibri"/>
+                <a:ea typeface="Calibri"/>
+                <a:cs typeface="Calibri"/>
+                <a:sym typeface="Calibri"/>
+              </a:rPr>
+              <a:t> class from one of the above links, as follows:</a:t>
+            </a:r>
+            <a:endParaRPr sz="1200">
+              <a:latin typeface="Calibri"/>
+              <a:ea typeface="Calibri"/>
+              <a:cs typeface="Calibri"/>
+              <a:sym typeface="Calibri"/>
+            </a:endParaRPr>
+          </a:p>
+          <a:p>
+            <a:pPr lvl="0" defTabSz="914400">
+              <a:lnSpc>
+                <a:spcPct val="100000"/>
+              </a:lnSpc>
+              <a:spcBef>
+                <a:spcPts val="600"/>
+              </a:spcBef>
+              <a:buSzPct val="100000"/>
+              <a:buChar char="-"/>
+              <a:defRPr sz="1800"/>
+            </a:pPr>
+            <a:r>
+              <a:rPr sz="1900">
+                <a:latin typeface="Calibri"/>
+                <a:ea typeface="Calibri"/>
+                <a:cs typeface="Calibri"/>
+                <a:sym typeface="Calibri"/>
+              </a:rPr>
+              <a:t> Click </a:t>
+            </a:r>
+            <a:r>
+              <a:rPr sz="1900">
+                <a:solidFill>
+                  <a:srgbClr val="9BBB59"/>
+                </a:solidFill>
+                <a:latin typeface="Calibri"/>
+                <a:ea typeface="Calibri"/>
+                <a:cs typeface="Calibri"/>
+                <a:sym typeface="Calibri"/>
+              </a:rPr>
+              <a:t>java.lang</a:t>
+            </a:r>
+            <a:r>
+              <a:rPr sz="1900">
+                <a:latin typeface="Calibri"/>
+                <a:ea typeface="Calibri"/>
+                <a:cs typeface="Calibri"/>
+                <a:sym typeface="Calibri"/>
+              </a:rPr>
+              <a:t> in the top-left pane</a:t>
+            </a:r>
+            <a:endParaRPr sz="1200">
+              <a:latin typeface="Calibri"/>
+              <a:ea typeface="Calibri"/>
+              <a:cs typeface="Calibri"/>
+              <a:sym typeface="Calibri"/>
+            </a:endParaRPr>
+          </a:p>
+          <a:p>
+            <a:pPr lvl="0" defTabSz="914400">
+              <a:lnSpc>
+                <a:spcPct val="100000"/>
+              </a:lnSpc>
+              <a:spcBef>
+                <a:spcPts val="600"/>
+              </a:spcBef>
+              <a:buSzPct val="100000"/>
+              <a:buChar char="-"/>
+              <a:defRPr sz="1800"/>
+            </a:pPr>
+            <a:r>
+              <a:rPr sz="1900">
+                <a:latin typeface="Calibri"/>
+                <a:ea typeface="Calibri"/>
+                <a:cs typeface="Calibri"/>
+                <a:sym typeface="Calibri"/>
+              </a:rPr>
+              <a:t> Then click </a:t>
+            </a:r>
+            <a:r>
+              <a:rPr sz="1900">
+                <a:solidFill>
+                  <a:srgbClr val="9BBB59"/>
+                </a:solidFill>
+                <a:latin typeface="Calibri"/>
+                <a:ea typeface="Calibri"/>
+                <a:cs typeface="Calibri"/>
+                <a:sym typeface="Calibri"/>
+              </a:rPr>
+              <a:t>String</a:t>
+            </a:r>
+            <a:r>
+              <a:rPr sz="1900">
+                <a:latin typeface="Calibri"/>
+                <a:ea typeface="Calibri"/>
+                <a:cs typeface="Calibri"/>
+                <a:sym typeface="Calibri"/>
+              </a:rPr>
+              <a:t> in the bottom-left pane</a:t>
+            </a:r>
+            <a:endParaRPr sz="1200">
+              <a:latin typeface="Calibri"/>
+              <a:ea typeface="Calibri"/>
+              <a:cs typeface="Calibri"/>
+              <a:sym typeface="Calibri"/>
+            </a:endParaRPr>
+          </a:p>
+          <a:p>
+            <a:pPr lvl="0" defTabSz="914400">
+              <a:lnSpc>
+                <a:spcPct val="100000"/>
+              </a:lnSpc>
+              <a:spcBef>
+                <a:spcPts val="400"/>
+              </a:spcBef>
+              <a:defRPr sz="1800"/>
+            </a:pPr>
+            <a:endParaRPr sz="1200">
+              <a:latin typeface="Calibri"/>
+              <a:ea typeface="Calibri"/>
+              <a:cs typeface="Calibri"/>
+              <a:sym typeface="Calibri"/>
+            </a:endParaRPr>
+          </a:p>
+          <a:p>
+            <a:pPr lvl="0" defTabSz="914400">
+              <a:lnSpc>
+                <a:spcPct val="100000"/>
+              </a:lnSpc>
+              <a:spcBef>
+                <a:spcPts val="400"/>
+              </a:spcBef>
+              <a:defRPr sz="1800"/>
+            </a:pPr>
+            <a:r>
+              <a:rPr sz="1200">
+                <a:latin typeface="Calibri"/>
+                <a:ea typeface="Calibri"/>
+                <a:cs typeface="Calibri"/>
+                <a:sym typeface="Calibri"/>
+              </a:rPr>
+              <a:t>Describe the parts of the String API documentation:</a:t>
+            </a:r>
+          </a:p>
+          <a:p>
+            <a:pPr lvl="0" defTabSz="914400">
+              <a:lnSpc>
+                <a:spcPct val="100000"/>
+              </a:lnSpc>
+              <a:spcBef>
+                <a:spcPts val="400"/>
+              </a:spcBef>
+              <a:defRPr sz="1800"/>
+            </a:pPr>
+            <a:r>
+              <a:rPr sz="1200">
+                <a:latin typeface="Calibri"/>
+                <a:ea typeface="Calibri"/>
+                <a:cs typeface="Calibri"/>
+                <a:sym typeface="Calibri"/>
+              </a:rPr>
+              <a:t>- description of the class</a:t>
+            </a:r>
+          </a:p>
+          <a:p>
+            <a:pPr lvl="0" defTabSz="914400">
+              <a:lnSpc>
+                <a:spcPct val="100000"/>
+              </a:lnSpc>
+              <a:spcBef>
+                <a:spcPts val="400"/>
+              </a:spcBef>
+              <a:defRPr sz="1800"/>
+            </a:pPr>
+            <a:r>
+              <a:rPr sz="1200">
+                <a:latin typeface="Calibri"/>
+                <a:ea typeface="Calibri"/>
+                <a:cs typeface="Calibri"/>
+                <a:sym typeface="Calibri"/>
+              </a:rPr>
+              <a:t>- summaries of all the fields, constructors, and method</a:t>
+            </a:r>
+          </a:p>
+          <a:p>
+            <a:pPr marL="162130" lvl="0" indent="-162130" defTabSz="914400">
+              <a:lnSpc>
+                <a:spcPct val="100000"/>
+              </a:lnSpc>
+              <a:spcBef>
+                <a:spcPts val="400"/>
+              </a:spcBef>
+              <a:buSzPct val="100000"/>
+              <a:buChar char="-"/>
+              <a:defRPr sz="1800"/>
+            </a:pPr>
+            <a:r>
+              <a:rPr sz="1200">
+                <a:latin typeface="Calibri"/>
+                <a:ea typeface="Calibri"/>
+                <a:cs typeface="Calibri"/>
+                <a:sym typeface="Calibri"/>
+              </a:rPr>
+              <a:t>detailed descriptions of everything</a:t>
+            </a:r>
+          </a:p>
+        </p:txBody>
+      </p:sp>
+    </p:spTree>
+    <p:extLst>
+      <p:ext uri="{BB962C8B-B14F-4D97-AF65-F5344CB8AC3E}">
+        <p14:creationId xmlns:p14="http://schemas.microsoft.com/office/powerpoint/2010/main" val="1218477835"/>
+      </p:ext>
+    </p:extLst>
+  </p:cSld>
+  <p:clrMapOvr>
+    <a:masterClrMapping/>
+  </p:clrMapOvr>
+</p:notes>
+</file>
+
+<file path=ppt/notesSlides/notesSlide17.xml><?xml version="1.0" encoding="utf-8"?>
+<p:notes xmlns:a="http://schemas.openxmlformats.org/drawingml/2006/main" xmlns:r="http://schemas.openxmlformats.org/officeDocument/2006/relationships" xmlns:p="http://schemas.openxmlformats.org/presentationml/2006/main">
+  <p:cSld>
+    <p:spTree>
+      <p:nvGrpSpPr>
+        <p:cNvPr id="1" name=""/>
+        <p:cNvGrpSpPr/>
+        <p:nvPr/>
+      </p:nvGrpSpPr>
+      <p:grpSpPr>
+        <a:xfrm>
+          <a:off x="0" y="0"/>
+          <a:ext cx="0" cy="0"/>
+          <a:chOff x="0" y="0"/>
+          <a:chExt cx="0" cy="0"/>
+        </a:xfrm>
+      </p:grpSpPr>
+      <p:sp>
+        <p:nvSpPr>
           <p:cNvPr id="84" name="Shape 84"/>
           <p:cNvSpPr>
             <a:spLocks noGrp="1" noRot="1" noChangeAspect="1"/>
@@ -1314,7 +1384,7 @@
 </p:notes>
 </file>
 
-<file path=ppt/notesSlides/notesSlide17.xml><?xml version="1.0" encoding="utf-8"?>
+<file path=ppt/notesSlides/notesSlide18.xml><?xml version="1.0" encoding="utf-8"?>
 <p:notes xmlns:a="http://schemas.openxmlformats.org/drawingml/2006/main" xmlns:r="http://schemas.openxmlformats.org/officeDocument/2006/relationships" xmlns:p="http://schemas.openxmlformats.org/presentationml/2006/main">
   <p:cSld>
     <p:spTree>
@@ -6131,7 +6201,7 @@
           </a:ln>
           <a:extLst>
             <a:ext uri="{C572A759-6A51-4108-AA02-DFA0A04FC94B}">
-              <ma14:wrappingTextBoxFlag xmlns="" xmlns:ma14="http://schemas.microsoft.com/office/mac/drawingml/2011/main" val="1"/>
+              <ma14:wrappingTextBoxFlag xmlns:ma14="http://schemas.microsoft.com/office/mac/drawingml/2011/main" xmlns="" val="1"/>
             </a:ext>
           </a:extLst>
         </p:spPr>
@@ -6174,7 +6244,7 @@
           </a:ln>
           <a:extLst>
             <a:ext uri="{C572A759-6A51-4108-AA02-DFA0A04FC94B}">
-              <ma14:wrappingTextBoxFlag xmlns="" xmlns:ma14="http://schemas.microsoft.com/office/mac/drawingml/2011/main" val="1"/>
+              <ma14:wrappingTextBoxFlag xmlns:ma14="http://schemas.microsoft.com/office/mac/drawingml/2011/main" xmlns="" val="1"/>
             </a:ext>
           </a:extLst>
         </p:spPr>
@@ -10716,7 +10786,7 @@
           </a:ln>
           <a:extLst>
             <a:ext uri="{C572A759-6A51-4108-AA02-DFA0A04FC94B}">
-              <ma14:wrappingTextBoxFlag xmlns="" xmlns:ma14="http://schemas.microsoft.com/office/mac/drawingml/2011/main" val="1"/>
+              <ma14:wrappingTextBoxFlag xmlns:ma14="http://schemas.microsoft.com/office/mac/drawingml/2011/main" xmlns="" val="1"/>
             </a:ext>
           </a:extLst>
         </p:spPr>
@@ -11166,7 +11236,7 @@
               <a:effectLst/>
               <a:extLst>
                 <a:ext uri="{C572A759-6A51-4108-AA02-DFA0A04FC94B}">
-                  <ma14:wrappingTextBoxFlag xmlns="" xmlns:ma14="http://schemas.microsoft.com/office/mac/drawingml/2011/main" val="1"/>
+                  <ma14:wrappingTextBoxFlag xmlns:ma14="http://schemas.microsoft.com/office/mac/drawingml/2011/main" xmlns="" val="1"/>
                 </a:ext>
               </a:extLst>
             </p:spPr>
@@ -11348,7 +11418,7 @@
               <a:effectLst/>
               <a:extLst>
                 <a:ext uri="{C572A759-6A51-4108-AA02-DFA0A04FC94B}">
-                  <ma14:wrappingTextBoxFlag xmlns="" xmlns:ma14="http://schemas.microsoft.com/office/mac/drawingml/2011/main" val="1"/>
+                  <ma14:wrappingTextBoxFlag xmlns:ma14="http://schemas.microsoft.com/office/mac/drawingml/2011/main" xmlns="" val="1"/>
                 </a:ext>
               </a:extLst>
             </p:spPr>
@@ -11521,7 +11591,7 @@
               <a:effectLst/>
               <a:extLst>
                 <a:ext uri="{C572A759-6A51-4108-AA02-DFA0A04FC94B}">
-                  <ma14:wrappingTextBoxFlag xmlns="" xmlns:ma14="http://schemas.microsoft.com/office/mac/drawingml/2011/main" val="1"/>
+                  <ma14:wrappingTextBoxFlag xmlns:ma14="http://schemas.microsoft.com/office/mac/drawingml/2011/main" xmlns="" val="1"/>
                 </a:ext>
               </a:extLst>
             </p:spPr>
@@ -11730,7 +11800,7 @@
               <a:effectLst/>
               <a:extLst>
                 <a:ext uri="{C572A759-6A51-4108-AA02-DFA0A04FC94B}">
-                  <ma14:wrappingTextBoxFlag xmlns="" xmlns:ma14="http://schemas.microsoft.com/office/mac/drawingml/2011/main" val="1"/>
+                  <ma14:wrappingTextBoxFlag xmlns:ma14="http://schemas.microsoft.com/office/mac/drawingml/2011/main" xmlns="" val="1"/>
                 </a:ext>
               </a:extLst>
             </p:spPr>
@@ -11926,7 +11996,7 @@
             <a:effectLst/>
             <a:extLst>
               <a:ext uri="{C572A759-6A51-4108-AA02-DFA0A04FC94B}">
-                <ma14:wrappingTextBoxFlag xmlns="" xmlns:ma14="http://schemas.microsoft.com/office/mac/drawingml/2011/main" val="1"/>
+                <ma14:wrappingTextBoxFlag xmlns:ma14="http://schemas.microsoft.com/office/mac/drawingml/2011/main" xmlns="" val="1"/>
               </a:ext>
             </a:extLst>
           </p:spPr>
@@ -12724,6 +12794,187 @@
       </p:grpSpPr>
       <p:sp>
         <p:nvSpPr>
+          <p:cNvPr id="2" name="Title 1"/>
+          <p:cNvSpPr>
+            <a:spLocks noGrp="1"/>
+          </p:cNvSpPr>
+          <p:nvPr>
+            <p:ph type="title"/>
+          </p:nvPr>
+        </p:nvSpPr>
+        <p:spPr/>
+        <p:txBody>
+          <a:bodyPr/>
+          <a:lstStyle/>
+          <a:p>
+            <a:r>
+              <a:rPr lang="en-US" dirty="0" smtClean="0"/>
+              <a:t>Quick Rule for Comparisons</a:t>
+            </a:r>
+            <a:endParaRPr lang="en-US" dirty="0"/>
+          </a:p>
+        </p:txBody>
+      </p:sp>
+      <p:sp>
+        <p:nvSpPr>
+          <p:cNvPr id="3" name="Text Placeholder 2"/>
+          <p:cNvSpPr>
+            <a:spLocks noGrp="1"/>
+          </p:cNvSpPr>
+          <p:nvPr>
+            <p:ph type="body" idx="1"/>
+          </p:nvPr>
+        </p:nvSpPr>
+        <p:spPr/>
+        <p:txBody>
+          <a:bodyPr/>
+          <a:lstStyle/>
+          <a:p>
+            <a:r>
+              <a:rPr lang="en-US" dirty="0" smtClean="0"/>
+              <a:t>Fast rules for now:</a:t>
+            </a:r>
+          </a:p>
+          <a:p>
+            <a:r>
+              <a:rPr lang="en-US" dirty="0" smtClean="0"/>
+              <a:t>Use .equals() for comparing Strings</a:t>
+            </a:r>
+          </a:p>
+          <a:p>
+            <a:pPr lvl="1"/>
+            <a:r>
+              <a:rPr lang="en-US" dirty="0" smtClean="0"/>
+              <a:t>String alpha = “</a:t>
+            </a:r>
+            <a:r>
+              <a:rPr lang="en-US" dirty="0" err="1" smtClean="0"/>
+              <a:t>aaa</a:t>
+            </a:r>
+            <a:r>
+              <a:rPr lang="en-US" dirty="0" smtClean="0"/>
+              <a:t>”;</a:t>
+            </a:r>
+          </a:p>
+          <a:p>
+            <a:pPr lvl="1"/>
+            <a:r>
+              <a:rPr lang="en-US" dirty="0" smtClean="0"/>
+              <a:t>if (</a:t>
+            </a:r>
+            <a:r>
+              <a:rPr lang="en-US" dirty="0" err="1" smtClean="0"/>
+              <a:t>alpha.equals</a:t>
+            </a:r>
+            <a:r>
+              <a:rPr lang="en-US" dirty="0" smtClean="0"/>
+              <a:t>(“</a:t>
+            </a:r>
+            <a:r>
+              <a:rPr lang="en-US" dirty="0" err="1" smtClean="0"/>
+              <a:t>bbb</a:t>
+            </a:r>
+            <a:r>
+              <a:rPr lang="en-US" dirty="0" smtClean="0"/>
+              <a:t>”) {</a:t>
+            </a:r>
+          </a:p>
+          <a:p>
+            <a:pPr lvl="1"/>
+            <a:r>
+              <a:rPr lang="en-US" dirty="0" smtClean="0"/>
+              <a:t>	</a:t>
+            </a:r>
+            <a:r>
+              <a:rPr lang="en-US" dirty="0" err="1" smtClean="0"/>
+              <a:t>System.out.println</a:t>
+            </a:r>
+            <a:r>
+              <a:rPr lang="en-US" dirty="0" smtClean="0"/>
+              <a:t>(“Yes!”)</a:t>
+            </a:r>
+          </a:p>
+          <a:p>
+            <a:pPr lvl="1"/>
+            <a:r>
+              <a:rPr lang="en-US" dirty="0" smtClean="0"/>
+              <a:t>} // end if</a:t>
+            </a:r>
+          </a:p>
+          <a:p>
+            <a:r>
+              <a:rPr lang="en-US" dirty="0" smtClean="0"/>
+              <a:t>Use == comparing numbers or char (primitives)</a:t>
+            </a:r>
+          </a:p>
+          <a:p>
+            <a:r>
+              <a:rPr lang="en-US" dirty="0" err="1" smtClean="0"/>
+              <a:t>boolean</a:t>
+            </a:r>
+            <a:r>
+              <a:rPr lang="en-US" dirty="0" smtClean="0"/>
+              <a:t> a = (5 == 6);</a:t>
+            </a:r>
+          </a:p>
+          <a:p>
+            <a:r>
+              <a:rPr lang="en-US" dirty="0" err="1" smtClean="0"/>
+              <a:t>boolean</a:t>
+            </a:r>
+            <a:r>
+              <a:rPr lang="en-US" dirty="0" smtClean="0"/>
+              <a:t> b = (‘T’ == ‘F’ );</a:t>
+            </a:r>
+          </a:p>
+          <a:p>
+            <a:endParaRPr lang="en-US" dirty="0" smtClean="0"/>
+          </a:p>
+          <a:p>
+            <a:endParaRPr lang="en-US" dirty="0"/>
+          </a:p>
+        </p:txBody>
+      </p:sp>
+    </p:spTree>
+    <p:extLst>
+      <p:ext uri="{BB962C8B-B14F-4D97-AF65-F5344CB8AC3E}">
+        <p14:creationId xmlns:p14="http://schemas.microsoft.com/office/powerpoint/2010/main" val="947730381"/>
+      </p:ext>
+    </p:extLst>
+  </p:cSld>
+  <p:clrMapOvr>
+    <a:masterClrMapping/>
+  </p:clrMapOvr>
+  <mc:AlternateContent xmlns:mc="http://schemas.openxmlformats.org/markup-compatibility/2006">
+    <mc:Choice xmlns:p14="http://schemas.microsoft.com/office/powerpoint/2010/main" Requires="p14">
+      <p:transition spd="slow" p14:dur="2000"/>
+    </mc:Choice>
+    <mc:Fallback>
+      <p:transition spd="slow"/>
+    </mc:Fallback>
+  </mc:AlternateContent>
+</p:sld>
+</file>
+
+<file path=ppt/slides/slide33.xml><?xml version="1.0" encoding="utf-8"?>
+<p:sld xmlns:a="http://schemas.openxmlformats.org/drawingml/2006/main" xmlns:r="http://schemas.openxmlformats.org/officeDocument/2006/relationships" xmlns:p="http://schemas.openxmlformats.org/presentationml/2006/main">
+  <p:cSld>
+    <p:spTree>
+      <p:nvGrpSpPr>
+        <p:cNvPr id="1" name=""/>
+        <p:cNvGrpSpPr/>
+        <p:nvPr/>
+      </p:nvGrpSpPr>
+      <p:grpSpPr>
+        <a:xfrm>
+          <a:off x="0" y="0"/>
+          <a:ext cx="0" cy="0"/>
+          <a:chOff x="0" y="0"/>
+          <a:chExt cx="0" cy="0"/>
+        </a:xfrm>
+      </p:grpSpPr>
+      <p:sp>
+        <p:nvSpPr>
           <p:cNvPr id="72" name="Shape 72"/>
           <p:cNvSpPr>
             <a:spLocks noGrp="1"/>
@@ -12878,7 +13129,7 @@
           </a:ln>
           <a:extLst>
             <a:ext uri="{C572A759-6A51-4108-AA02-DFA0A04FC94B}">
-              <ma14:wrappingTextBoxFlag xmlns="" xmlns:ma14="http://schemas.microsoft.com/office/mac/drawingml/2011/main" val="1"/>
+              <ma14:wrappingTextBoxFlag xmlns:ma14="http://schemas.microsoft.com/office/mac/drawingml/2011/main" xmlns="" val="1"/>
             </a:ext>
           </a:extLst>
         </p:spPr>
@@ -12990,7 +13241,7 @@
           </a:ln>
           <a:extLst>
             <a:ext uri="{C572A759-6A51-4108-AA02-DFA0A04FC94B}">
-              <ma14:wrappingTextBoxFlag xmlns="" xmlns:ma14="http://schemas.microsoft.com/office/mac/drawingml/2011/main" val="1"/>
+              <ma14:wrappingTextBoxFlag xmlns:ma14="http://schemas.microsoft.com/office/mac/drawingml/2011/main" xmlns="" val="1"/>
             </a:ext>
           </a:extLst>
         </p:spPr>
@@ -13170,7 +13421,7 @@
 </p:sld>
 </file>
 
-<file path=ppt/slides/slide33.xml><?xml version="1.0" encoding="utf-8"?>
+<file path=ppt/slides/slide34.xml><?xml version="1.0" encoding="utf-8"?>
 <p:sld xmlns:a="http://schemas.openxmlformats.org/drawingml/2006/main" xmlns:r="http://schemas.openxmlformats.org/officeDocument/2006/relationships" xmlns:p="http://schemas.openxmlformats.org/presentationml/2006/main">
   <p:cSld>
     <p:spTree>
@@ -13343,7 +13594,7 @@
 </p:sld>
 </file>
 
-<file path=ppt/slides/slide34.xml><?xml version="1.0" encoding="utf-8"?>
+<file path=ppt/slides/slide35.xml><?xml version="1.0" encoding="utf-8"?>
 <p:sld xmlns:a="http://schemas.openxmlformats.org/drawingml/2006/main" xmlns:r="http://schemas.openxmlformats.org/officeDocument/2006/relationships" xmlns:p="http://schemas.openxmlformats.org/presentationml/2006/main">
   <p:cSld>
     <p:spTree>
@@ -13516,7 +13767,7 @@
           </a:ln>
           <a:extLst>
             <a:ext uri="{C572A759-6A51-4108-AA02-DFA0A04FC94B}">
-              <ma14:wrappingTextBoxFlag xmlns="" xmlns:ma14="http://schemas.microsoft.com/office/mac/drawingml/2011/main" val="1"/>
+              <ma14:wrappingTextBoxFlag xmlns:ma14="http://schemas.microsoft.com/office/mac/drawingml/2011/main" xmlns="" val="1"/>
             </a:ext>
           </a:extLst>
         </p:spPr>
@@ -13565,7 +13816,7 @@
 </p:sld>
 </file>
 
-<file path=ppt/slides/slide35.xml><?xml version="1.0" encoding="utf-8"?>
+<file path=ppt/slides/slide36.xml><?xml version="1.0" encoding="utf-8"?>
 <p:sld xmlns:a="http://schemas.openxmlformats.org/drawingml/2006/main" xmlns:r="http://schemas.openxmlformats.org/officeDocument/2006/relationships" xmlns:p="http://schemas.openxmlformats.org/presentationml/2006/main">
   <p:cSld>
     <p:spTree>
@@ -13774,7 +14025,7 @@
 </p:sld>
 </file>
 
-<file path=ppt/slides/slide36.xml><?xml version="1.0" encoding="utf-8"?>
+<file path=ppt/slides/slide37.xml><?xml version="1.0" encoding="utf-8"?>
 <p:sld xmlns:a="http://schemas.openxmlformats.org/drawingml/2006/main" xmlns:r="http://schemas.openxmlformats.org/officeDocument/2006/relationships" xmlns:p="http://schemas.openxmlformats.org/presentationml/2006/main">
   <p:cSld>
     <p:spTree>
@@ -13934,7 +14185,7 @@
 </p:sld>
 </file>
 
-<file path=ppt/slides/slide37.xml><?xml version="1.0" encoding="utf-8"?>
+<file path=ppt/slides/slide38.xml><?xml version="1.0" encoding="utf-8"?>
 <p:sld xmlns:a="http://schemas.openxmlformats.org/drawingml/2006/main" xmlns:r="http://schemas.openxmlformats.org/officeDocument/2006/relationships" xmlns:p="http://schemas.openxmlformats.org/presentationml/2006/main">
   <p:cSld>
     <p:spTree>
@@ -14073,7 +14324,7 @@
           </a:prstGeom>
           <a:extLst>
             <a:ext uri="{C572A759-6A51-4108-AA02-DFA0A04FC94B}">
-              <ma14:wrappingTextBoxFlag xmlns="" xmlns:ma14="http://schemas.microsoft.com/office/mac/drawingml/2011/main" val="1"/>
+              <ma14:wrappingTextBoxFlag xmlns:ma14="http://schemas.microsoft.com/office/mac/drawingml/2011/main" xmlns="" val="1"/>
             </a:ext>
           </a:extLst>
         </p:spPr>
@@ -14094,7 +14345,7 @@
                   <a:srgbClr val="888888"/>
                 </a:solidFill>
               </a:rPr>
-              <a:t>37</a:t>
+              <a:t>38</a:t>
             </a:fld>
             <a:endParaRPr sz="1200">
               <a:solidFill>
@@ -14311,11 +14562,7 @@
             <a:pPr lvl="1"/>
             <a:r>
               <a:rPr lang="en-US" dirty="0" smtClean="0"/>
-              <a:t>Feel </a:t>
-            </a:r>
-            <a:r>
-              <a:rPr lang="en-US" dirty="0" smtClean="0"/>
-              <a:t>free to </a:t>
+              <a:t>Feel free to </a:t>
             </a:r>
             <a:r>
               <a:rPr lang="en-US" dirty="0"/>
@@ -14349,24 +14596,15 @@
             <a:pPr lvl="1"/>
             <a:r>
               <a:rPr lang="en-US" dirty="0" smtClean="0"/>
-              <a:t>Degree: Computer </a:t>
-            </a:r>
+              <a:t>Degree: Computer Science, Cognitive Science</a:t>
+            </a:r>
+          </a:p>
+          <a:p>
+            <a:pPr lvl="1"/>
             <a:r>
               <a:rPr lang="en-US" dirty="0" smtClean="0"/>
-              <a:t>Science, Cognitive Science</a:t>
-            </a:r>
-          </a:p>
-          <a:p>
-            <a:pPr lvl="1"/>
-            <a:r>
-              <a:rPr lang="en-US" dirty="0" smtClean="0"/>
-              <a:t>Only on campus </a:t>
-            </a:r>
-            <a:r>
-              <a:rPr lang="en-US" dirty="0" smtClean="0"/>
-              <a:t>Tue-Fri</a:t>
-            </a:r>
-            <a:endParaRPr lang="en-US" dirty="0" smtClean="0"/>
+              <a:t>Only on campus Tue-Fri</a:t>
+            </a:r>
           </a:p>
           <a:p>
             <a:pPr lvl="1"/>
@@ -14465,11 +14703,7 @@
           <a:p>
             <a:r>
               <a:rPr lang="en-US" dirty="0" smtClean="0"/>
-              <a:t>Meetings </a:t>
-            </a:r>
-            <a:r>
-              <a:rPr lang="en-US" dirty="0" smtClean="0"/>
-              <a:t>with me 1 on 1</a:t>
+              <a:t>Meetings with me 1 on 1</a:t>
             </a:r>
             <a:endParaRPr lang="en-US" dirty="0"/>
           </a:p>
@@ -14481,23 +14715,14 @@
             </a:r>
             <a:r>
               <a:rPr lang="en-US" dirty="0" smtClean="0"/>
-              <a:t>: a service </a:t>
-            </a:r>
+              <a:t>: a service to schedule </a:t>
+            </a:r>
+          </a:p>
+          <a:p>
+            <a:pPr lvl="1"/>
             <a:r>
               <a:rPr lang="en-US" dirty="0" smtClean="0"/>
-              <a:t>to schedule </a:t>
-            </a:r>
-            <a:endParaRPr lang="en-US" dirty="0" smtClean="0"/>
-          </a:p>
-          <a:p>
-            <a:pPr lvl="1"/>
-            <a:r>
-              <a:rPr lang="en-US" dirty="0" smtClean="0"/>
-              <a:t>appointments (in </a:t>
-            </a:r>
-            <a:r>
-              <a:rPr lang="en-US" dirty="0" smtClean="0"/>
-              <a:t>my email signature)</a:t>
+              <a:t>appointments (in my email signature)</a:t>
             </a:r>
           </a:p>
           <a:p>
@@ -14518,22 +14743,14 @@
             <a:pPr lvl="2"/>
             <a:r>
               <a:rPr lang="en-US" dirty="0" smtClean="0"/>
-              <a:t>Mondays: Skype/Google </a:t>
-            </a:r>
+              <a:t>Mondays: Skype/Google hangout</a:t>
+            </a:r>
+          </a:p>
+          <a:p>
+            <a:pPr lvl="2"/>
             <a:r>
               <a:rPr lang="en-US" dirty="0" smtClean="0"/>
-              <a:t>hangout</a:t>
-            </a:r>
-          </a:p>
-          <a:p>
-            <a:pPr lvl="2"/>
-            <a:r>
-              <a:rPr lang="en-US" dirty="0" smtClean="0"/>
-              <a:t>Tue-Fri:  </a:t>
-            </a:r>
-            <a:r>
-              <a:rPr lang="en-US" dirty="0" smtClean="0"/>
-              <a:t>After 5pm, before 8am</a:t>
+              <a:t>Tue-Fri:  After 5pm, before 8am</a:t>
             </a:r>
             <a:endParaRPr lang="en-US" dirty="0"/>
           </a:p>
@@ -14653,13 +14870,8 @@
             <a:pPr lvl="1"/>
             <a:r>
               <a:rPr lang="en-US" dirty="0" smtClean="0"/>
-              <a:t>I am in Bloomington </a:t>
-            </a:r>
-            <a:r>
-              <a:rPr lang="en-US" dirty="0" smtClean="0"/>
-              <a:t>Sat-Monday</a:t>
-            </a:r>
-            <a:endParaRPr lang="en-US" dirty="0" smtClean="0"/>
+              <a:t>I am in Bloomington Sat-Monday</a:t>
+            </a:r>
           </a:p>
           <a:p>
             <a:pPr lvl="1"/>
@@ -14806,7 +15018,6 @@
               <a:rPr lang="en-US" dirty="0" smtClean="0"/>
               <a:t>Students</a:t>
             </a:r>
-            <a:endParaRPr lang="en-US" dirty="0" smtClean="0"/>
           </a:p>
           <a:p>
             <a:pPr lvl="1"/>

</xml_diff>